<commit_message>
Updated PlanOnAPage for GW2
Have filled most sections. Needs review from whole team
</commit_message>
<xml_diff>
--- a/PlanOnAPage GW2 - Team EARTH.pptx
+++ b/PlanOnAPage GW2 - Team EARTH.pptx
@@ -3698,7 +3698,7 @@
           <a:p>
             <a:fld id="{B0336C00-8D0F-1D46-AC77-763F480FC148}" type="datetimeFigureOut">
               <a:rPr lang="en-US" smtClean="0"/>
-              <a:t>12/13/2019</a:t>
+              <a:t>1/8/2020</a:t>
             </a:fld>
             <a:endParaRPr lang="en-US" dirty="0"/>
           </a:p>
@@ -4285,7 +4285,7 @@
             <a:fld id="{E2098E45-8613-C448-9E1A-94EC1524DA2C}" type="datetimeFigureOut">
               <a:rPr lang="en-GB" altLang="en-US"/>
               <a:pPr/>
-              <a:t>13/12/2019</a:t>
+              <a:t>08/01/2020</a:t>
             </a:fld>
             <a:endParaRPr lang="en-GB" altLang="en-US" dirty="0"/>
           </a:p>
@@ -4500,7 +4500,7 @@
             <a:fld id="{E80A0F75-BCCC-DA41-AAE2-B7061CF7B4B1}" type="datetimeFigureOut">
               <a:rPr lang="en-GB" altLang="en-US"/>
               <a:pPr/>
-              <a:t>13/12/2019</a:t>
+              <a:t>08/01/2020</a:t>
             </a:fld>
             <a:endParaRPr lang="en-GB" altLang="en-US" dirty="0"/>
           </a:p>
@@ -4783,7 +4783,7 @@
             <a:fld id="{BBAC0CC7-17C0-5246-9D9C-199D1928C7ED}" type="datetimeFigureOut">
               <a:rPr lang="en-GB" altLang="en-US"/>
               <a:pPr/>
-              <a:t>13/12/2019</a:t>
+              <a:t>08/01/2020</a:t>
             </a:fld>
             <a:endParaRPr lang="en-GB" altLang="en-US" dirty="0"/>
           </a:p>
@@ -5111,7 +5111,7 @@
             <a:fld id="{0F652A3C-3E6D-5245-AE3D-038F994A070F}" type="datetimeFigureOut">
               <a:rPr lang="en-GB" altLang="en-US"/>
               <a:pPr/>
-              <a:t>13/12/2019</a:t>
+              <a:t>08/01/2020</a:t>
             </a:fld>
             <a:endParaRPr lang="en-GB" altLang="en-US" dirty="0"/>
           </a:p>
@@ -5411,7 +5411,7 @@
             <a:fld id="{99B714EF-1B8F-7843-9384-B6CACED58BB8}" type="datetimeFigureOut">
               <a:rPr lang="en-GB" altLang="en-US"/>
               <a:pPr/>
-              <a:t>13/12/2019</a:t>
+              <a:t>08/01/2020</a:t>
             </a:fld>
             <a:endParaRPr lang="en-GB" altLang="en-US" dirty="0"/>
           </a:p>
@@ -5541,7 +5541,7 @@
             <a:fld id="{0ABFB3EE-3F72-9A45-8B23-B03DB6D51EFF}" type="datetimeFigureOut">
               <a:rPr lang="en-GB" altLang="en-US"/>
               <a:pPr/>
-              <a:t>13/12/2019</a:t>
+              <a:t>08/01/2020</a:t>
             </a:fld>
             <a:endParaRPr lang="en-GB" altLang="en-US" dirty="0"/>
           </a:p>
@@ -5836,7 +5836,7 @@
             <a:fld id="{DE3B8E72-D842-5F4F-8456-57799CFE5BF0}" type="datetimeFigureOut">
               <a:rPr lang="en-GB" altLang="en-US"/>
               <a:pPr/>
-              <a:t>13/12/2019</a:t>
+              <a:t>08/01/2020</a:t>
             </a:fld>
             <a:endParaRPr lang="en-GB" altLang="en-US" dirty="0"/>
           </a:p>
@@ -6152,7 +6152,7 @@
             <a:fld id="{BAFDC76B-2780-2747-8F70-38AF00AD5A4E}" type="datetimeFigureOut">
               <a:rPr lang="en-GB" altLang="en-US"/>
               <a:pPr/>
-              <a:t>13/12/2019</a:t>
+              <a:t>08/01/2020</a:t>
             </a:fld>
             <a:endParaRPr lang="en-GB" altLang="en-US" dirty="0"/>
           </a:p>
@@ -6772,7 +6772,7 @@
           <a:p>
             <a:r>
               <a:rPr lang="en-US" dirty="0"/>
-              <a:t>25/10/2019</a:t>
+              <a:t>09/01/2020</a:t>
             </a:r>
             <a:endParaRPr lang="en-US" b="0" dirty="0"/>
           </a:p>
@@ -6815,7 +6815,7 @@
         </p:style>
         <p:txBody>
           <a:bodyPr vert="horz" wrap="none" lIns="128016" tIns="64008" rIns="128016" bIns="64008" rtlCol="0" anchor="t">
-            <a:normAutofit/>
+            <a:normAutofit lnSpcReduction="10000"/>
           </a:bodyPr>
           <a:lstStyle/>
           <a:p>
@@ -6825,10 +6825,29 @@
             </a:r>
           </a:p>
           <a:p>
-            <a:pPr marL="171450" indent="-171450">
-              <a:buFontTx/>
-              <a:buChar char="-"/>
-            </a:pPr>
+            <a:r>
+              <a:rPr lang="en-US" sz="1200" b="1" dirty="0"/>
+              <a:t>Aim: </a:t>
+            </a:r>
+            <a:r>
+              <a:rPr lang="en-US" sz="1200" dirty="0"/>
+              <a:t>Accurately identify and sort rubbish from a beach, </a:t>
+            </a:r>
+          </a:p>
+          <a:p>
+            <a:r>
+              <a:rPr lang="en-US" sz="1200" dirty="0"/>
+              <a:t>         leaving it in a higher standard than when arriving.</a:t>
+            </a:r>
+          </a:p>
+          <a:p>
+            <a:br>
+              <a:rPr lang="en-US" sz="1200" b="1" dirty="0"/>
+            </a:br>
+            <a:r>
+              <a:rPr lang="en-US" sz="1200" b="1" dirty="0"/>
+              <a:t>Current Objectives</a:t>
+            </a:r>
             <a:endParaRPr lang="en-US" sz="1200" dirty="0"/>
           </a:p>
           <a:p>
@@ -6838,13 +6857,7 @@
             </a:pPr>
             <a:r>
               <a:rPr lang="en-US" sz="1200" dirty="0"/>
-              <a:t>Accurately identify and sort rubbish from a beach </a:t>
-            </a:r>
-          </a:p>
-          <a:p>
-            <a:r>
-              <a:rPr lang="en-US" sz="1200" dirty="0"/>
-              <a:t>    leaving it in a higher standard than when arriving</a:t>
+              <a:t>Grabbing trash</a:t>
             </a:r>
           </a:p>
           <a:p>
@@ -6854,7 +6867,17 @@
             </a:pPr>
             <a:r>
               <a:rPr lang="en-US" sz="1200" dirty="0"/>
-              <a:t>Identify and mitigate hazards</a:t>
+              <a:t>Sorting trash</a:t>
+            </a:r>
+          </a:p>
+          <a:p>
+            <a:pPr marL="171450" indent="-171450">
+              <a:buFontTx/>
+              <a:buChar char="-"/>
+            </a:pPr>
+            <a:r>
+              <a:rPr lang="en-US" sz="1200" dirty="0"/>
+              <a:t>Intelligent path planning</a:t>
             </a:r>
           </a:p>
         </p:txBody>
@@ -6905,7 +6928,7 @@
         <p:spPr>
           <a:xfrm>
             <a:off x="8533885" y="1473579"/>
-            <a:ext cx="4035416" cy="744819"/>
+            <a:ext cx="4035416" cy="914096"/>
           </a:xfrm>
           <a:prstGeom prst="rect">
             <a:avLst/>
@@ -6935,12 +6958,28 @@
               <a:rPr lang="en-US" b="1" dirty="0"/>
               <a:t>Budget statement</a:t>
             </a:r>
+            <a:endParaRPr lang="en-US" sz="1100" dirty="0"/>
           </a:p>
           <a:p>
             <a:pPr marL="285750" indent="-285750">
               <a:buFontTx/>
               <a:buChar char="-"/>
             </a:pPr>
+            <a:r>
+              <a:rPr lang="en-US" sz="1100" b="1" dirty="0"/>
+              <a:t>Remaining Budget: £ 120</a:t>
+            </a:r>
+            <a:endParaRPr lang="en-US" sz="1100" dirty="0"/>
+          </a:p>
+          <a:p>
+            <a:pPr marL="285750" indent="-285750">
+              <a:buFontTx/>
+              <a:buChar char="-"/>
+            </a:pPr>
+            <a:r>
+              <a:rPr lang="en-US" sz="1100" b="1" dirty="0"/>
+              <a:t>Budget: £ 80.45</a:t>
+            </a:r>
             <a:endParaRPr lang="en-US" sz="1100" dirty="0"/>
           </a:p>
           <a:p>
@@ -6976,8 +7015,8 @@
         </p:nvSpPr>
         <p:spPr>
           <a:xfrm>
-            <a:off x="4384576" y="1473518"/>
-            <a:ext cx="4035416" cy="2545185"/>
+            <a:off x="4384576" y="1473517"/>
+            <a:ext cx="4035416" cy="3365821"/>
           </a:xfrm>
           <a:prstGeom prst="rect">
             <a:avLst/>
@@ -7072,7 +7111,7 @@
         </p:style>
         <p:txBody>
           <a:bodyPr vert="horz" wrap="none" lIns="128016" tIns="64008" rIns="128016" bIns="64008" rtlCol="0" anchor="t">
-            <a:normAutofit/>
+            <a:normAutofit fontScale="92500" lnSpcReduction="20000"/>
           </a:bodyPr>
           <a:lstStyle/>
           <a:p>
@@ -7095,8 +7134,13 @@
             </a:pPr>
             <a:r>
               <a:rPr lang="en-US" sz="1200" dirty="0"/>
-              <a:t>Group members </a:t>
+              <a:t>The company staff, shareholders, suppliers, </a:t>
             </a:r>
+            <a:r>
+              <a:rPr lang="en-US" sz="1200" dirty="0" err="1"/>
+              <a:t>etc</a:t>
+            </a:r>
+            <a:endParaRPr lang="en-US" sz="1200" dirty="0"/>
           </a:p>
           <a:p>
             <a:pPr marL="171450" indent="-171450">
@@ -7105,7 +7149,7 @@
             </a:pPr>
             <a:r>
               <a:rPr lang="en-US" sz="1200" dirty="0"/>
-              <a:t>University</a:t>
+              <a:t>System operators</a:t>
             </a:r>
           </a:p>
           <a:p>
@@ -7115,7 +7159,7 @@
             </a:pPr>
             <a:r>
               <a:rPr lang="en-US" sz="1200" dirty="0"/>
-              <a:t>National Instruments + Prospective Employers</a:t>
+              <a:t>People on the beach</a:t>
             </a:r>
           </a:p>
           <a:p>
@@ -7125,7 +7169,27 @@
             </a:pPr>
             <a:r>
               <a:rPr lang="en-US" sz="1200" dirty="0"/>
-              <a:t>Wildlife on beaches</a:t>
+              <a:t>Wildlife on the beach</a:t>
+            </a:r>
+          </a:p>
+          <a:p>
+            <a:pPr marL="171450" indent="-171450">
+              <a:buFontTx/>
+              <a:buChar char="-"/>
+            </a:pPr>
+            <a:r>
+              <a:rPr lang="en-US" sz="1200" dirty="0"/>
+              <a:t>Beach Management</a:t>
+            </a:r>
+          </a:p>
+          <a:p>
+            <a:pPr marL="171450" indent="-171450">
+              <a:buFontTx/>
+              <a:buChar char="-"/>
+            </a:pPr>
+            <a:r>
+              <a:rPr lang="en-US" sz="1200" dirty="0"/>
+              <a:t>Recycling businesses</a:t>
             </a:r>
           </a:p>
         </p:txBody>
@@ -7178,12 +7242,65 @@
             <a:endParaRPr lang="en-US" i="1" dirty="0"/>
           </a:p>
           <a:p>
-            <a:endParaRPr lang="en-US" sz="1200" dirty="0"/>
-          </a:p>
-          <a:p>
+            <a:endParaRPr lang="en-US" i="1" dirty="0"/>
+          </a:p>
+          <a:p>
+            <a:pPr marL="171450" indent="-171450">
+              <a:buFontTx/>
+              <a:buChar char="-"/>
+            </a:pPr>
             <a:r>
               <a:rPr lang="en-US" sz="1200" dirty="0"/>
-              <a:t>Target: High level of autonomy</a:t>
+              <a:t>Consult with PST on major steps involving trash pick up when sorting</a:t>
+            </a:r>
+          </a:p>
+          <a:p>
+            <a:pPr marL="171450" indent="-171450">
+              <a:buFontTx/>
+              <a:buChar char="-"/>
+            </a:pPr>
+            <a:r>
+              <a:rPr lang="en-US" sz="1200" dirty="0"/>
+              <a:t>Spend more hours in January as less classes and coursework</a:t>
+            </a:r>
+          </a:p>
+          <a:p>
+            <a:pPr marL="171450" indent="-171450">
+              <a:buFontTx/>
+              <a:buChar char="-"/>
+            </a:pPr>
+            <a:r>
+              <a:rPr lang="en-US" sz="1200" dirty="0"/>
+              <a:t>Integrate different implemented modules of the system using ROS </a:t>
+            </a:r>
+          </a:p>
+          <a:p>
+            <a:pPr marL="171450" indent="-171450">
+              <a:buFontTx/>
+              <a:buChar char="-"/>
+            </a:pPr>
+            <a:r>
+              <a:rPr lang="en-US" sz="1200" dirty="0"/>
+              <a:t>Minimize unnecessary complexity to the system while maintaining robustness</a:t>
+            </a:r>
+          </a:p>
+          <a:p>
+            <a:pPr marL="171450" indent="-171450">
+              <a:buFontTx/>
+              <a:buChar char="-"/>
+            </a:pPr>
+            <a:endParaRPr lang="en-US" sz="1200" dirty="0"/>
+          </a:p>
+          <a:p>
+            <a:r>
+              <a:rPr lang="en-US" sz="1200" dirty="0"/>
+              <a:t>Currently working on: Finishing and integrating systems</a:t>
+            </a:r>
+          </a:p>
+          <a:p>
+            <a:r>
+              <a:rPr lang="en-US" sz="1200" dirty="0"/>
+              <a:t>Target: High level of autonomy?</a:t>
             </a:r>
           </a:p>
         </p:txBody>
@@ -7202,8 +7319,8 @@
         </p:nvSpPr>
         <p:spPr>
           <a:xfrm>
-            <a:off x="8537005" y="2610066"/>
-            <a:ext cx="4035416" cy="2400420"/>
+            <a:off x="8537005" y="2431357"/>
+            <a:ext cx="4035416" cy="3333673"/>
           </a:xfrm>
           <a:prstGeom prst="rect">
             <a:avLst/>
@@ -7250,8 +7367,8 @@
         </p:nvSpPr>
         <p:spPr>
           <a:xfrm>
-            <a:off x="8537005" y="5113249"/>
-            <a:ext cx="4035416" cy="1822864"/>
+            <a:off x="8537005" y="5808712"/>
+            <a:ext cx="4035416" cy="1127400"/>
           </a:xfrm>
           <a:prstGeom prst="rect">
             <a:avLst/>
@@ -7279,11 +7396,48 @@
           <a:p>
             <a:r>
               <a:rPr lang="en-US" b="1" dirty="0"/>
-              <a:t>Key issues and risks </a:t>
+              <a:t>Key issues and risks</a:t>
             </a:r>
           </a:p>
           <a:p>
-            <a:endParaRPr lang="en-US" b="1" dirty="0"/>
+            <a:pPr marL="285750" indent="-285750">
+              <a:buFontTx/>
+              <a:buChar char="-"/>
+            </a:pPr>
+            <a:r>
+              <a:rPr lang="en-US" sz="1100" dirty="0"/>
+              <a:t>Grabbing objects and placing them in appropriate bin</a:t>
+            </a:r>
+          </a:p>
+          <a:p>
+            <a:pPr marL="285750" indent="-285750">
+              <a:buFontTx/>
+              <a:buChar char="-"/>
+            </a:pPr>
+            <a:r>
+              <a:rPr lang="en-US" sz="1100" dirty="0"/>
+              <a:t>Unsure how waterline will be</a:t>
+            </a:r>
+          </a:p>
+          <a:p>
+            <a:pPr marL="285750" indent="-285750">
+              <a:buFontTx/>
+              <a:buChar char="-"/>
+            </a:pPr>
+            <a:r>
+              <a:rPr lang="en-US" sz="1100" dirty="0"/>
+              <a:t>Integration</a:t>
+            </a:r>
+          </a:p>
+          <a:p>
+            <a:pPr marL="285750" indent="-285750">
+              <a:buFontTx/>
+              <a:buChar char="-"/>
+            </a:pPr>
+            <a:r>
+              <a:rPr lang="en-US" sz="1100" dirty="0"/>
+              <a:t>Hardware failure as viva approaches</a:t>
+            </a:r>
           </a:p>
         </p:txBody>
       </p:sp>
@@ -7349,12 +7503,15 @@
         </p:nvSpPr>
         <p:spPr>
           <a:xfrm>
-            <a:off x="256880" y="8017425"/>
-            <a:ext cx="2560426" cy="288033"/>
+            <a:off x="256879" y="8017425"/>
+            <a:ext cx="3938909" cy="288033"/>
           </a:xfrm>
           <a:prstGeom prst="rect">
             <a:avLst/>
           </a:prstGeom>
+          <a:solidFill>
+            <a:srgbClr val="92D050"/>
+          </a:solidFill>
         </p:spPr>
         <p:style>
           <a:lnRef idx="2">
@@ -7432,18 +7589,32 @@
               <a:rPr lang="en-US" dirty="0"/>
               <a:t>E.A.R.T.H  </a:t>
             </a:r>
-          </a:p>
-          <a:p>
+            <a:br>
+              <a:rPr lang="en-US" dirty="0"/>
+            </a:br>
             <a:r>
-              <a:rPr lang="en-US" dirty="0">
+              <a:rPr lang="en-US" sz="1100" dirty="0" err="1"/>
+              <a:t>Github</a:t>
+            </a:r>
+            <a:r>
+              <a:rPr lang="en-US" sz="1100" dirty="0"/>
+              <a:t>: </a:t>
+            </a:r>
+          </a:p>
+          <a:p>
+            <a:r>
+              <a:rPr lang="en-US" sz="1000" dirty="0">
                 <a:hlinkClick r:id="rId9"/>
               </a:rPr>
               <a:t>https://github.com/orgs/lboroWMEME-19WSD001/teams/e-a-r-t-h</a:t>
             </a:r>
-            <a:endParaRPr lang="en-US" dirty="0"/>
-          </a:p>
-          <a:p>
-            <a:endParaRPr lang="en-US" dirty="0"/>
+            <a:endParaRPr lang="en-US" sz="1000" dirty="0"/>
+          </a:p>
+          <a:p>
+            <a:r>
+              <a:rPr lang="en-US" sz="1100" dirty="0"/>
+              <a:t>E-portfolio: </a:t>
+            </a:r>
           </a:p>
         </p:txBody>
       </p:sp>
@@ -7977,14 +8148,14 @@
           <p:nvPr>
             <p:extLst>
               <p:ext uri="{D42A27DB-BD31-4B8C-83A1-F6EECF244321}">
-                <p14:modId xmlns:p14="http://schemas.microsoft.com/office/powerpoint/2010/main" val="3141875198"/>
+                <p14:modId xmlns:p14="http://schemas.microsoft.com/office/powerpoint/2010/main" val="3528660768"/>
               </p:ext>
             </p:extLst>
           </p:nvPr>
         </p:nvGraphicFramePr>
         <p:xfrm>
-          <a:off x="8622358" y="2928392"/>
-          <a:ext cx="3826370" cy="1872210"/>
+          <a:off x="8646338" y="2810473"/>
+          <a:ext cx="3826370" cy="2773680"/>
         </p:xfrm>
         <a:graphic>
           <a:graphicData uri="http://schemas.openxmlformats.org/drawingml/2006/table">
@@ -7993,14 +8164,14 @@
                 <a:tableStyleId>{00A15C55-8517-42AA-B614-E9B94910E393}</a:tableStyleId>
               </a:tblPr>
               <a:tblGrid>
-                <a:gridCol w="2602978">
+                <a:gridCol w="2802952">
                   <a:extLst>
                     <a:ext uri="{9D8B030D-6E8A-4147-A177-3AD203B41FA5}">
                       <a16:colId xmlns:a16="http://schemas.microsoft.com/office/drawing/2014/main" val="56170685"/>
                     </a:ext>
                   </a:extLst>
                 </a:gridCol>
-                <a:gridCol w="1223392">
+                <a:gridCol w="1023418">
                   <a:extLst>
                     <a:ext uri="{9D8B030D-6E8A-4147-A177-3AD203B41FA5}">
                       <a16:colId xmlns:a16="http://schemas.microsoft.com/office/drawing/2014/main" val="4188898219"/>
@@ -8008,14 +8179,14 @@
                   </a:extLst>
                 </a:gridCol>
               </a:tblGrid>
-              <a:tr h="374442">
+              <a:tr h="216024">
                 <a:tc>
                   <a:txBody>
                     <a:bodyPr/>
                     <a:lstStyle/>
                     <a:p>
                       <a:r>
-                        <a:rPr lang="en-GB" sz="1400" dirty="0"/>
+                        <a:rPr lang="en-GB" sz="1200" dirty="0"/>
                         <a:t>Phase</a:t>
                       </a:r>
                     </a:p>
@@ -8028,7 +8199,7 @@
                     <a:lstStyle/>
                     <a:p>
                       <a:r>
-                        <a:rPr lang="en-GB" sz="1400" dirty="0"/>
+                        <a:rPr lang="en-GB" sz="1200" dirty="0"/>
                         <a:t>Completion</a:t>
                       </a:r>
                     </a:p>
@@ -8048,8 +8219,8 @@
                     <a:lstStyle/>
                     <a:p>
                       <a:r>
-                        <a:rPr lang="en-GB" sz="1400" dirty="0"/>
-                        <a:t>Research + Initial Ideas</a:t>
+                        <a:rPr lang="en-GB" sz="1000" dirty="0"/>
+                        <a:t>Enter and navigate the beach area using intelligent route finding​</a:t>
                       </a:r>
                     </a:p>
                   </a:txBody>
@@ -8065,7 +8236,7 @@
                   </a:txBody>
                   <a:tcPr>
                     <a:solidFill>
-                      <a:srgbClr val="92D050"/>
+                      <a:srgbClr val="FFC000"/>
                     </a:solidFill>
                   </a:tcPr>
                 </a:tc>
@@ -8082,8 +8253,8 @@
                     <a:lstStyle/>
                     <a:p>
                       <a:r>
-                        <a:rPr lang="en-GB" sz="1400" dirty="0"/>
-                        <a:t>Basic Control</a:t>
+                        <a:rPr lang="en-GB" sz="1000" dirty="0"/>
+                        <a:t>Identify recycling bins from optically coded sensors (at least 3 different types)</a:t>
                       </a:r>
                     </a:p>
                   </a:txBody>
@@ -8099,7 +8270,7 @@
                   </a:txBody>
                   <a:tcPr>
                     <a:solidFill>
-                      <a:srgbClr val="92D050"/>
+                      <a:srgbClr val="FFC000"/>
                     </a:solidFill>
                   </a:tcPr>
                 </a:tc>
@@ -8109,15 +8280,15 @@
                   </a:ext>
                 </a:extLst>
               </a:tr>
-              <a:tr h="374442">
+              <a:tr h="273976">
                 <a:tc>
                   <a:txBody>
                     <a:bodyPr/>
                     <a:lstStyle/>
                     <a:p>
                       <a:r>
-                        <a:rPr lang="en-GB" sz="1400" dirty="0"/>
-                        <a:t>Human Control</a:t>
+                        <a:rPr lang="en-GB" sz="1000" dirty="0"/>
+                        <a:t>Identify and sort different types of rubbish</a:t>
                       </a:r>
                     </a:p>
                   </a:txBody>
@@ -8150,8 +8321,46 @@
                     <a:lstStyle/>
                     <a:p>
                       <a:r>
-                        <a:rPr lang="en-GB" sz="1400" dirty="0"/>
-                        <a:t>Automation</a:t>
+                        <a:rPr lang="en-GB" sz="1000" dirty="0"/>
+                        <a:t>Identify and characterize different crab types and the routes taken​</a:t>
+                      </a:r>
+                    </a:p>
+                  </a:txBody>
+                  <a:tcPr/>
+                </a:tc>
+                <a:tc>
+                  <a:txBody>
+                    <a:bodyPr/>
+                    <a:lstStyle/>
+                    <a:p>
+                      <a:endParaRPr lang="en-GB" sz="1400" dirty="0">
+                        <a:solidFill>
+                          <a:srgbClr val="FF0000"/>
+                        </a:solidFill>
+                      </a:endParaRPr>
+                    </a:p>
+                  </a:txBody>
+                  <a:tcPr>
+                    <a:solidFill>
+                      <a:srgbClr val="FFC000"/>
+                    </a:solidFill>
+                  </a:tcPr>
+                </a:tc>
+                <a:extLst>
+                  <a:ext uri="{0D108BD9-81ED-4DB2-BD59-A6C34878D82A}">
+                    <a16:rowId xmlns:a16="http://schemas.microsoft.com/office/drawing/2014/main" val="1212419433"/>
+                  </a:ext>
+                </a:extLst>
+              </a:tr>
+              <a:tr h="0">
+                <a:tc>
+                  <a:txBody>
+                    <a:bodyPr/>
+                    <a:lstStyle/>
+                    <a:p>
+                      <a:r>
+                        <a:rPr lang="en-GB" sz="1000" dirty="0"/>
+                        <a:t>Actively avoid interfering with the crabs​</a:t>
                       </a:r>
                     </a:p>
                   </a:txBody>
@@ -8167,13 +8376,81 @@
                   </a:txBody>
                   <a:tcPr>
                     <a:solidFill>
-                      <a:srgbClr val="FF0000"/>
+                      <a:srgbClr val="FFC000"/>
                     </a:solidFill>
                   </a:tcPr>
                 </a:tc>
                 <a:extLst>
                   <a:ext uri="{0D108BD9-81ED-4DB2-BD59-A6C34878D82A}">
-                    <a16:rowId xmlns:a16="http://schemas.microsoft.com/office/drawing/2014/main" val="1212419433"/>
+                    <a16:rowId xmlns:a16="http://schemas.microsoft.com/office/drawing/2014/main" val="3473387285"/>
+                  </a:ext>
+                </a:extLst>
+              </a:tr>
+              <a:tr h="256816">
+                <a:tc>
+                  <a:txBody>
+                    <a:bodyPr/>
+                    <a:lstStyle/>
+                    <a:p>
+                      <a:r>
+                        <a:rPr lang="en-GB" sz="1000" dirty="0"/>
+                        <a:t>Identify and alert operators about other wildlife​</a:t>
+                      </a:r>
+                    </a:p>
+                  </a:txBody>
+                  <a:tcPr/>
+                </a:tc>
+                <a:tc>
+                  <a:txBody>
+                    <a:bodyPr/>
+                    <a:lstStyle/>
+                    <a:p>
+                      <a:endParaRPr lang="en-GB" sz="1400" dirty="0"/>
+                    </a:p>
+                  </a:txBody>
+                  <a:tcPr>
+                    <a:solidFill>
+                      <a:srgbClr val="FFC000"/>
+                    </a:solidFill>
+                  </a:tcPr>
+                </a:tc>
+                <a:extLst>
+                  <a:ext uri="{0D108BD9-81ED-4DB2-BD59-A6C34878D82A}">
+                    <a16:rowId xmlns:a16="http://schemas.microsoft.com/office/drawing/2014/main" val="4049401967"/>
+                  </a:ext>
+                </a:extLst>
+              </a:tr>
+              <a:tr h="374442">
+                <a:tc>
+                  <a:txBody>
+                    <a:bodyPr/>
+                    <a:lstStyle/>
+                    <a:p>
+                      <a:r>
+                        <a:rPr lang="en-GB" sz="1000" dirty="0"/>
+                        <a:t>Identify waterline and actively avoid or mitigate against the incoming tide</a:t>
+                      </a:r>
+                    </a:p>
+                  </a:txBody>
+                  <a:tcPr/>
+                </a:tc>
+                <a:tc>
+                  <a:txBody>
+                    <a:bodyPr/>
+                    <a:lstStyle/>
+                    <a:p>
+                      <a:endParaRPr lang="en-GB" sz="1400" dirty="0"/>
+                    </a:p>
+                  </a:txBody>
+                  <a:tcPr>
+                    <a:solidFill>
+                      <a:srgbClr val="FFC000"/>
+                    </a:solidFill>
+                  </a:tcPr>
+                </a:tc>
+                <a:extLst>
+                  <a:ext uri="{0D108BD9-81ED-4DB2-BD59-A6C34878D82A}">
+                    <a16:rowId xmlns:a16="http://schemas.microsoft.com/office/drawing/2014/main" val="530888197"/>
                   </a:ext>
                 </a:extLst>
               </a:tr>
@@ -8196,14 +8473,14 @@
           <p:nvPr>
             <p:extLst>
               <p:ext uri="{D42A27DB-BD31-4B8C-83A1-F6EECF244321}">
-                <p14:modId xmlns:p14="http://schemas.microsoft.com/office/powerpoint/2010/main" val="1254587834"/>
+                <p14:modId xmlns:p14="http://schemas.microsoft.com/office/powerpoint/2010/main" val="854187712"/>
               </p:ext>
             </p:extLst>
           </p:nvPr>
         </p:nvGraphicFramePr>
         <p:xfrm>
           <a:off x="4415430" y="1849444"/>
-          <a:ext cx="3978712" cy="2133600"/>
+          <a:ext cx="3978712" cy="2935536"/>
         </p:xfrm>
         <a:graphic>
           <a:graphicData uri="http://schemas.openxmlformats.org/drawingml/2006/table">
@@ -8284,7 +8561,7 @@
                         <a:defRPr/>
                       </a:pPr>
                       <a:r>
-                        <a:rPr kumimoji="0" lang="en-US" sz="1200" b="0" i="0" u="none" strike="noStrike" kern="1200" cap="none" spc="0" normalizeH="0" baseline="0" noProof="0" dirty="0">
+                        <a:rPr kumimoji="0" lang="en-US" sz="1000" b="0" i="0" u="none" strike="noStrike" kern="1200" cap="none" spc="0" normalizeH="0" baseline="0" noProof="0" dirty="0">
                           <a:ln>
                             <a:noFill/>
                           </a:ln>
@@ -8298,9 +8575,9 @@
                           <a:ea typeface="+mn-ea"/>
                           <a:cs typeface="+mn-cs"/>
                         </a:rPr>
-                        <a:t>Independent control of robot vehicles and arms Via Xbox Controller</a:t>
+                        <a:t>Independent control of robot vehicles via Xbox Controller</a:t>
                       </a:r>
-                      <a:endParaRPr kumimoji="0" lang="en-US" sz="1200" b="0" i="0" u="none" strike="noStrike" kern="1200" cap="none" spc="0" normalizeH="0" baseline="0" noProof="0" dirty="0">
+                      <a:endParaRPr kumimoji="0" lang="en-US" sz="1000" b="0" i="0" u="none" strike="noStrike" kern="1200" cap="none" spc="0" normalizeH="0" baseline="0" noProof="0" dirty="0">
                         <a:ln>
                           <a:noFill/>
                         </a:ln>
@@ -8368,8 +8645,8 @@
                   </a:ext>
                 </a:extLst>
               </a:tr>
-              <a:tr h="261705">
-                <a:tc>
+              <a:tr h="0">
+                <a:tc rowSpan="3">
                   <a:txBody>
                     <a:bodyPr/>
                     <a:lstStyle/>
@@ -8392,7 +8669,7 @@
                         <a:defRPr/>
                       </a:pPr>
                       <a:r>
-                        <a:rPr kumimoji="0" lang="en-US" sz="1200" b="0" i="0" u="none" strike="noStrike" kern="1200" cap="none" spc="0" normalizeH="0" baseline="0" noProof="0" dirty="0">
+                        <a:rPr kumimoji="0" lang="en-US" sz="1000" b="0" i="0" u="none" strike="noStrike" kern="1200" cap="none" spc="0" normalizeH="0" baseline="0" noProof="0" dirty="0">
                           <a:ln>
                             <a:noFill/>
                           </a:ln>
@@ -8406,9 +8683,75 @@
                           <a:ea typeface="+mn-ea"/>
                           <a:cs typeface="+mn-cs"/>
                         </a:rPr>
-                        <a:t>Sorting System </a:t>
+                        <a:t>Sorting – Object recognition</a:t>
                       </a:r>
-                      <a:endParaRPr kumimoji="0" lang="en-US" sz="1200" b="0" i="0" u="none" strike="noStrike" kern="1200" cap="none" spc="0" normalizeH="0" baseline="0" noProof="0" dirty="0">
+                      <a:br>
+                        <a:rPr kumimoji="0" lang="en-US" sz="1000" b="0" i="0" u="none" strike="noStrike" kern="1200" cap="none" spc="0" normalizeH="0" baseline="0" noProof="0" dirty="0">
+                          <a:ln>
+                            <a:noFill/>
+                          </a:ln>
+                          <a:solidFill>
+                            <a:prstClr val="black"/>
+                          </a:solidFill>
+                          <a:effectLst/>
+                          <a:uLnTx/>
+                          <a:uFillTx/>
+                          <a:latin typeface="+mn-lt"/>
+                          <a:ea typeface="+mn-ea"/>
+                          <a:cs typeface="+mn-cs"/>
+                        </a:rPr>
+                      </a:br>
+                      <a:r>
+                        <a:rPr kumimoji="0" lang="en-US" sz="1000" b="0" i="0" u="none" strike="noStrike" kern="1200" cap="none" spc="0" normalizeH="0" baseline="0" noProof="0" dirty="0">
+                          <a:ln>
+                            <a:noFill/>
+                          </a:ln>
+                          <a:solidFill>
+                            <a:prstClr val="black"/>
+                          </a:solidFill>
+                          <a:effectLst/>
+                          <a:uLnTx/>
+                          <a:uFillTx/>
+                          <a:latin typeface="+mn-lt"/>
+                          <a:ea typeface="+mn-ea"/>
+                          <a:cs typeface="+mn-cs"/>
+                        </a:rPr>
+                        <a:t>Sorting – Grabbing object</a:t>
+                      </a:r>
+                      <a:br>
+                        <a:rPr kumimoji="0" lang="en-US" sz="1000" b="0" i="0" u="none" strike="noStrike" kern="1200" cap="none" spc="0" normalizeH="0" baseline="0" noProof="0" dirty="0">
+                          <a:ln>
+                            <a:noFill/>
+                          </a:ln>
+                          <a:solidFill>
+                            <a:prstClr val="black"/>
+                          </a:solidFill>
+                          <a:effectLst/>
+                          <a:uLnTx/>
+                          <a:uFillTx/>
+                          <a:latin typeface="+mn-lt"/>
+                          <a:ea typeface="+mn-ea"/>
+                          <a:cs typeface="+mn-cs"/>
+                        </a:rPr>
+                      </a:br>
+                      <a:r>
+                        <a:rPr kumimoji="0" lang="en-US" sz="1000" b="0" i="0" u="none" strike="noStrike" kern="1200" cap="none" spc="0" normalizeH="0" baseline="0" noProof="0" dirty="0">
+                          <a:ln>
+                            <a:noFill/>
+                          </a:ln>
+                          <a:solidFill>
+                            <a:prstClr val="black"/>
+                          </a:solidFill>
+                          <a:effectLst/>
+                          <a:uLnTx/>
+                          <a:uFillTx/>
+                          <a:latin typeface="+mn-lt"/>
+                          <a:ea typeface="+mn-ea"/>
+                          <a:cs typeface="+mn-cs"/>
+                        </a:rPr>
+                        <a:t>Sorting – Placing in appropriate bin</a:t>
+                      </a:r>
+                      <a:endParaRPr kumimoji="0" lang="en-US" sz="1000" b="0" i="0" u="none" strike="noStrike" kern="1200" cap="none" spc="0" normalizeH="0" baseline="0" noProof="0" dirty="0">
                         <a:ln>
                           <a:noFill/>
                         </a:ln>
@@ -8448,7 +8791,68 @@
                         <a:tabLst/>
                         <a:defRPr/>
                       </a:pPr>
-                      <a:endParaRPr kumimoji="0" lang="en-US" sz="1200" b="0" i="0" u="none" strike="noStrike" kern="1200" cap="none" spc="0" normalizeH="0" baseline="0" noProof="0" dirty="0">
+                      <a:endParaRPr kumimoji="0" lang="en-US" sz="600" b="0" i="0" u="none" strike="noStrike" kern="1200" cap="none" spc="0" normalizeH="0" baseline="0" noProof="0" dirty="0">
+                        <a:ln>
+                          <a:noFill/>
+                        </a:ln>
+                        <a:solidFill>
+                          <a:prstClr val="black"/>
+                        </a:solidFill>
+                        <a:effectLst/>
+                        <a:uLnTx/>
+                        <a:uFillTx/>
+                        <a:latin typeface="+mn-lt"/>
+                        <a:ea typeface="+mn-ea"/>
+                        <a:cs typeface="Arial"/>
+                      </a:endParaRPr>
+                    </a:p>
+                  </a:txBody>
+                  <a:tcPr>
+                    <a:solidFill>
+                      <a:srgbClr val="FFC000"/>
+                    </a:solidFill>
+                  </a:tcPr>
+                </a:tc>
+                <a:extLst>
+                  <a:ext uri="{0D108BD9-81ED-4DB2-BD59-A6C34878D82A}">
+                    <a16:rowId xmlns:a16="http://schemas.microsoft.com/office/drawing/2014/main" val="1844435413"/>
+                  </a:ext>
+                </a:extLst>
+              </a:tr>
+              <a:tr h="0">
+                <a:tc vMerge="1">
+                  <a:txBody>
+                    <a:bodyPr/>
+                    <a:lstStyle/>
+                    <a:p>
+                      <a:endParaRPr lang="en-GB"/>
+                    </a:p>
+                  </a:txBody>
+                  <a:tcPr/>
+                </a:tc>
+                <a:tc>
+                  <a:txBody>
+                    <a:bodyPr/>
+                    <a:lstStyle/>
+                    <a:p>
+                      <a:pPr marL="0" marR="0" lvl="0" indent="0" algn="l" defTabSz="914400" rtl="0" eaLnBrk="1" fontAlgn="base" latinLnBrk="0" hangingPunct="1">
+                        <a:lnSpc>
+                          <a:spcPct val="100000"/>
+                        </a:lnSpc>
+                        <a:spcBef>
+                          <a:spcPct val="0"/>
+                        </a:spcBef>
+                        <a:spcAft>
+                          <a:spcPct val="0"/>
+                        </a:spcAft>
+                        <a:buClrTx/>
+                        <a:buSzTx/>
+                        <a:buFontTx/>
+                        <a:buNone/>
+                        <a:tabLst/>
+                        <a:defRPr/>
+                      </a:pPr>
+                      <a:endParaRPr kumimoji="0" lang="en-US" sz="600" b="0" i="0" u="none" strike="noStrike" kern="1200" cap="none" spc="0" normalizeH="0" baseline="0" noProof="0" dirty="0">
                         <a:ln>
                           <a:noFill/>
                         </a:ln>
@@ -8472,7 +8876,68 @@
                 </a:tc>
                 <a:extLst>
                   <a:ext uri="{0D108BD9-81ED-4DB2-BD59-A6C34878D82A}">
-                    <a16:rowId xmlns:a16="http://schemas.microsoft.com/office/drawing/2014/main" val="1844435413"/>
+                    <a16:rowId xmlns:a16="http://schemas.microsoft.com/office/drawing/2014/main" val="2818569317"/>
+                  </a:ext>
+                </a:extLst>
+              </a:tr>
+              <a:tr h="213360">
+                <a:tc vMerge="1">
+                  <a:txBody>
+                    <a:bodyPr/>
+                    <a:lstStyle/>
+                    <a:p>
+                      <a:endParaRPr lang="en-GB"/>
+                    </a:p>
+                  </a:txBody>
+                  <a:tcPr/>
+                </a:tc>
+                <a:tc>
+                  <a:txBody>
+                    <a:bodyPr/>
+                    <a:lstStyle/>
+                    <a:p>
+                      <a:pPr marL="0" marR="0" lvl="0" indent="0" algn="l" defTabSz="914400" rtl="0" eaLnBrk="1" fontAlgn="base" latinLnBrk="0" hangingPunct="1">
+                        <a:lnSpc>
+                          <a:spcPct val="100000"/>
+                        </a:lnSpc>
+                        <a:spcBef>
+                          <a:spcPct val="0"/>
+                        </a:spcBef>
+                        <a:spcAft>
+                          <a:spcPct val="0"/>
+                        </a:spcAft>
+                        <a:buClrTx/>
+                        <a:buSzTx/>
+                        <a:buFontTx/>
+                        <a:buNone/>
+                        <a:tabLst/>
+                        <a:defRPr/>
+                      </a:pPr>
+                      <a:endParaRPr kumimoji="0" lang="en-US" sz="600" b="0" i="0" u="none" strike="noStrike" kern="1200" cap="none" spc="0" normalizeH="0" baseline="0" noProof="0" dirty="0">
+                        <a:ln>
+                          <a:noFill/>
+                        </a:ln>
+                        <a:solidFill>
+                          <a:prstClr val="black"/>
+                        </a:solidFill>
+                        <a:effectLst/>
+                        <a:uLnTx/>
+                        <a:uFillTx/>
+                        <a:latin typeface="+mn-lt"/>
+                        <a:ea typeface="+mn-ea"/>
+                        <a:cs typeface="Arial"/>
+                      </a:endParaRPr>
+                    </a:p>
+                  </a:txBody>
+                  <a:tcPr>
+                    <a:solidFill>
+                      <a:srgbClr val="FF0000"/>
+                    </a:solidFill>
+                  </a:tcPr>
+                </a:tc>
+                <a:extLst>
+                  <a:ext uri="{0D108BD9-81ED-4DB2-BD59-A6C34878D82A}">
+                    <a16:rowId xmlns:a16="http://schemas.microsoft.com/office/drawing/2014/main" val="994760366"/>
                   </a:ext>
                 </a:extLst>
               </a:tr>
@@ -8500,7 +8965,7 @@
                         <a:defRPr/>
                       </a:pPr>
                       <a:r>
-                        <a:rPr kumimoji="0" lang="en-US" sz="1200" b="0" i="0" u="none" strike="noStrike" kern="1200" cap="none" spc="0" normalizeH="0" baseline="0" noProof="0" dirty="0">
+                        <a:rPr kumimoji="0" lang="en-US" sz="1000" b="0" i="0" u="none" strike="noStrike" kern="1200" cap="none" spc="0" normalizeH="0" baseline="0" noProof="0" dirty="0">
                           <a:ln>
                             <a:noFill/>
                           </a:ln>
@@ -8516,7 +8981,7 @@
                         </a:rPr>
                         <a:t>Integration between systems using ROS</a:t>
                       </a:r>
-                      <a:endParaRPr kumimoji="0" lang="en-US" sz="1200" b="0" i="0" u="none" strike="noStrike" kern="1200" cap="none" spc="0" normalizeH="0" baseline="0" noProof="0" dirty="0">
+                      <a:endParaRPr kumimoji="0" lang="en-US" sz="1000" b="0" i="0" u="none" strike="noStrike" kern="1200" cap="none" spc="0" normalizeH="0" baseline="0" noProof="0" dirty="0">
                         <a:ln>
                           <a:noFill/>
                         </a:ln>
@@ -8580,12 +9045,12 @@
                 </a:tc>
                 <a:extLst>
                   <a:ext uri="{0D108BD9-81ED-4DB2-BD59-A6C34878D82A}">
-                    <a16:rowId xmlns:a16="http://schemas.microsoft.com/office/drawing/2014/main" val="1779427962"/>
+                    <a16:rowId xmlns:a16="http://schemas.microsoft.com/office/drawing/2014/main" val="1008436585"/>
                   </a:ext>
                 </a:extLst>
               </a:tr>
-              <a:tr h="261705">
-                <a:tc>
+              <a:tr h="198120">
+                <a:tc rowSpan="2">
                   <a:txBody>
                     <a:bodyPr/>
                     <a:lstStyle/>
@@ -8608,7 +9073,24 @@
                         <a:defRPr/>
                       </a:pPr>
                       <a:r>
-                        <a:rPr kumimoji="0" lang="en-US" sz="1200" b="0" i="0" u="none" strike="noStrike" kern="1200" cap="none" spc="0" normalizeH="0" baseline="0" noProof="0" dirty="0">
+                        <a:rPr kumimoji="0" lang="en-US" sz="1000" b="0" i="0" u="none" strike="noStrike" kern="1200" cap="none" spc="0" normalizeH="0" baseline="0" noProof="0" dirty="0">
+                          <a:ln>
+                            <a:noFill/>
+                          </a:ln>
+                          <a:solidFill>
+                            <a:prstClr val="black"/>
+                          </a:solidFill>
+                          <a:effectLst/>
+                          <a:uLnTx/>
+                          <a:uFillTx/>
+                          <a:latin typeface="+mn-lt"/>
+                          <a:ea typeface="+mn-ea"/>
+                          <a:cs typeface="Arial"/>
+                        </a:rPr>
+                        <a:t>Pathing</a:t>
+                      </a:r>
+                      <a:r>
+                        <a:rPr kumimoji="0" lang="en-US" sz="1000" b="0" i="0" u="none" strike="noStrike" kern="1200" cap="none" spc="0" normalizeH="0" baseline="0" noProof="0" dirty="0">
                           <a:ln>
                             <a:noFill/>
                           </a:ln>
@@ -8622,9 +9104,76 @@
                           <a:ea typeface="+mn-ea"/>
                           <a:cs typeface="+mn-cs"/>
                         </a:rPr>
-                        <a:t>Basic Pathing for robots</a:t>
+                        <a:t> – </a:t>
                       </a:r>
-                      <a:endParaRPr kumimoji="0" lang="en-US" sz="1200" b="0" i="0" u="none" strike="noStrike" kern="1200" cap="none" spc="0" normalizeH="0" baseline="0" noProof="0" dirty="0">
+                      <a:r>
+                        <a:rPr kumimoji="0" lang="en-US" sz="1000" b="0" i="0" u="none" strike="noStrike" kern="1200" cap="none" spc="0" normalizeH="0" baseline="0" noProof="0" dirty="0">
+                          <a:ln>
+                            <a:noFill/>
+                          </a:ln>
+                          <a:solidFill>
+                            <a:prstClr val="black"/>
+                          </a:solidFill>
+                          <a:effectLst/>
+                          <a:uLnTx/>
+                          <a:uFillTx/>
+                          <a:latin typeface="+mn-lt"/>
+                          <a:ea typeface="+mn-ea"/>
+                          <a:cs typeface="Arial"/>
+                        </a:rPr>
+                        <a:t>map of environment</a:t>
+                      </a:r>
+                      <a:br>
+                        <a:rPr kumimoji="0" lang="en-US" sz="1000" b="0" i="0" u="none" strike="noStrike" kern="1200" cap="none" spc="0" normalizeH="0" baseline="0" noProof="0" dirty="0">
+                          <a:ln>
+                            <a:noFill/>
+                          </a:ln>
+                          <a:solidFill>
+                            <a:prstClr val="black"/>
+                          </a:solidFill>
+                          <a:effectLst/>
+                          <a:uLnTx/>
+                          <a:uFillTx/>
+                          <a:latin typeface="+mn-lt"/>
+                          <a:ea typeface="+mn-ea"/>
+                          <a:cs typeface="Arial"/>
+                        </a:rPr>
+                      </a:br>
+                      <a:r>
+                        <a:rPr kumimoji="0" lang="en-US" sz="1000" b="0" i="0" u="none" strike="noStrike" kern="1200" cap="none" spc="0" normalizeH="0" baseline="0" noProof="0" dirty="0">
+                          <a:ln>
+                            <a:noFill/>
+                          </a:ln>
+                          <a:solidFill>
+                            <a:prstClr val="black"/>
+                          </a:solidFill>
+                          <a:effectLst/>
+                          <a:uLnTx/>
+                          <a:uFillTx/>
+                          <a:latin typeface="+mn-lt"/>
+                          <a:ea typeface="+mn-ea"/>
+                          <a:cs typeface="Arial"/>
+                        </a:rPr>
+                        <a:t>Pathing</a:t>
+                      </a:r>
+                      <a:r>
+                        <a:rPr kumimoji="0" lang="en-US" sz="1000" b="0" i="0" u="none" strike="noStrike" kern="1200" cap="none" spc="0" normalizeH="0" baseline="0" noProof="0" dirty="0">
+                          <a:ln>
+                            <a:noFill/>
+                          </a:ln>
+                          <a:solidFill>
+                            <a:prstClr val="black"/>
+                          </a:solidFill>
+                          <a:effectLst/>
+                          <a:uLnTx/>
+                          <a:uFillTx/>
+                          <a:latin typeface="+mn-lt"/>
+                          <a:ea typeface="+mn-ea"/>
+                          <a:cs typeface="+mn-cs"/>
+                        </a:rPr>
+                        <a:t> – decision of route to follow</a:t>
+                      </a:r>
+                      <a:endParaRPr kumimoji="0" lang="en-US" sz="1000" b="0" i="0" u="none" strike="noStrike" kern="1200" cap="none" spc="0" normalizeH="0" baseline="0" noProof="0" dirty="0">
                         <a:ln>
                           <a:noFill/>
                         </a:ln>
@@ -8664,7 +9213,68 @@
                         <a:tabLst/>
                         <a:defRPr/>
                       </a:pPr>
-                      <a:endParaRPr kumimoji="0" lang="en-US" sz="1200" b="0" i="0" u="none" strike="noStrike" kern="1200" cap="none" spc="0" normalizeH="0" baseline="0" noProof="0" dirty="0">
+                      <a:endParaRPr kumimoji="0" lang="en-US" sz="600" b="0" i="0" u="none" strike="noStrike" kern="1200" cap="none" spc="0" normalizeH="0" baseline="0" noProof="0" dirty="0">
+                        <a:ln>
+                          <a:noFill/>
+                        </a:ln>
+                        <a:solidFill>
+                          <a:prstClr val="black"/>
+                        </a:solidFill>
+                        <a:effectLst/>
+                        <a:uLnTx/>
+                        <a:uFillTx/>
+                        <a:latin typeface="+mn-lt"/>
+                        <a:ea typeface="+mn-ea"/>
+                        <a:cs typeface="Arial"/>
+                      </a:endParaRPr>
+                    </a:p>
+                  </a:txBody>
+                  <a:tcPr>
+                    <a:solidFill>
+                      <a:srgbClr val="FFC000"/>
+                    </a:solidFill>
+                  </a:tcPr>
+                </a:tc>
+                <a:extLst>
+                  <a:ext uri="{0D108BD9-81ED-4DB2-BD59-A6C34878D82A}">
+                    <a16:rowId xmlns:a16="http://schemas.microsoft.com/office/drawing/2014/main" val="905555157"/>
+                  </a:ext>
+                </a:extLst>
+              </a:tr>
+              <a:tr h="198120">
+                <a:tc vMerge="1">
+                  <a:txBody>
+                    <a:bodyPr/>
+                    <a:lstStyle/>
+                    <a:p>
+                      <a:endParaRPr lang="en-GB"/>
+                    </a:p>
+                  </a:txBody>
+                  <a:tcPr/>
+                </a:tc>
+                <a:tc>
+                  <a:txBody>
+                    <a:bodyPr/>
+                    <a:lstStyle/>
+                    <a:p>
+                      <a:pPr marL="0" marR="0" lvl="0" indent="0" algn="l" defTabSz="914400" rtl="0" eaLnBrk="1" fontAlgn="base" latinLnBrk="0" hangingPunct="1">
+                        <a:lnSpc>
+                          <a:spcPct val="100000"/>
+                        </a:lnSpc>
+                        <a:spcBef>
+                          <a:spcPct val="0"/>
+                        </a:spcBef>
+                        <a:spcAft>
+                          <a:spcPct val="0"/>
+                        </a:spcAft>
+                        <a:buClrTx/>
+                        <a:buSzTx/>
+                        <a:buFontTx/>
+                        <a:buNone/>
+                        <a:tabLst/>
+                        <a:defRPr/>
+                      </a:pPr>
+                      <a:endParaRPr kumimoji="0" lang="en-US" sz="600" b="0" i="0" u="none" strike="noStrike" kern="1200" cap="none" spc="0" normalizeH="0" baseline="0" noProof="0" dirty="0">
                         <a:ln>
                           <a:noFill/>
                         </a:ln>
@@ -8688,12 +9298,12 @@
                 </a:tc>
                 <a:extLst>
                   <a:ext uri="{0D108BD9-81ED-4DB2-BD59-A6C34878D82A}">
-                    <a16:rowId xmlns:a16="http://schemas.microsoft.com/office/drawing/2014/main" val="3837113402"/>
+                    <a16:rowId xmlns:a16="http://schemas.microsoft.com/office/drawing/2014/main" val="726031144"/>
                   </a:ext>
                 </a:extLst>
               </a:tr>
-              <a:tr h="261705">
-                <a:tc>
+              <a:tr h="198120">
+                <a:tc rowSpan="2">
                   <a:txBody>
                     <a:bodyPr/>
                     <a:lstStyle/>
@@ -8716,7 +9326,24 @@
                         <a:defRPr/>
                       </a:pPr>
                       <a:r>
-                        <a:rPr kumimoji="0" lang="en-US" sz="1200" b="0" i="0" u="none" strike="noStrike" kern="1200" cap="none" spc="0" normalizeH="0" baseline="0" noProof="0" dirty="0">
+                        <a:rPr kumimoji="0" lang="en-US" sz="1000" b="0" i="0" u="none" strike="noStrike" kern="1200" cap="none" spc="0" normalizeH="0" baseline="0" noProof="0" dirty="0">
+                          <a:ln>
+                            <a:noFill/>
+                          </a:ln>
+                          <a:solidFill>
+                            <a:prstClr val="black"/>
+                          </a:solidFill>
+                          <a:effectLst/>
+                          <a:uLnTx/>
+                          <a:uFillTx/>
+                          <a:latin typeface="+mn-lt"/>
+                          <a:ea typeface="+mn-ea"/>
+                          <a:cs typeface="Arial"/>
+                        </a:rPr>
+                        <a:t>Wildlife detection</a:t>
+                      </a:r>
+                      <a:r>
+                        <a:rPr kumimoji="0" lang="en-US" sz="1000" b="0" i="0" u="none" strike="noStrike" kern="1200" cap="none" spc="0" normalizeH="0" baseline="0" noProof="0" dirty="0">
                           <a:ln>
                             <a:noFill/>
                           </a:ln>
@@ -8730,9 +9357,59 @@
                           <a:ea typeface="+mn-ea"/>
                           <a:cs typeface="+mn-cs"/>
                         </a:rPr>
-                        <a:t>Detection of Wildlife</a:t>
+                        <a:t> – Crabs</a:t>
                       </a:r>
-                      <a:endParaRPr kumimoji="0" lang="en-US" sz="1200" b="0" i="0" u="none" strike="noStrike" kern="1200" cap="none" spc="0" normalizeH="0" baseline="0" noProof="0" dirty="0">
+                      <a:br>
+                        <a:rPr kumimoji="0" lang="en-US" sz="1000" b="0" i="0" u="none" strike="noStrike" kern="1200" cap="none" spc="0" normalizeH="0" baseline="0" noProof="0" dirty="0">
+                          <a:ln>
+                            <a:noFill/>
+                          </a:ln>
+                          <a:solidFill>
+                            <a:prstClr val="black"/>
+                          </a:solidFill>
+                          <a:effectLst/>
+                          <a:uLnTx/>
+                          <a:uFillTx/>
+                          <a:latin typeface="+mn-lt"/>
+                          <a:ea typeface="+mn-ea"/>
+                          <a:cs typeface="+mn-cs"/>
+                        </a:rPr>
+                      </a:br>
+                      <a:r>
+                        <a:rPr kumimoji="0" lang="en-US" sz="1000" b="0" i="0" u="none" strike="noStrike" kern="1200" cap="none" spc="0" normalizeH="0" baseline="0" noProof="0" dirty="0">
+                          <a:ln>
+                            <a:noFill/>
+                          </a:ln>
+                          <a:solidFill>
+                            <a:prstClr val="black"/>
+                          </a:solidFill>
+                          <a:effectLst/>
+                          <a:uLnTx/>
+                          <a:uFillTx/>
+                          <a:latin typeface="+mn-lt"/>
+                          <a:ea typeface="+mn-ea"/>
+                          <a:cs typeface="Arial"/>
+                        </a:rPr>
+                        <a:t>Wildlife detection</a:t>
+                      </a:r>
+                      <a:r>
+                        <a:rPr kumimoji="0" lang="en-US" sz="1000" b="0" i="0" u="none" strike="noStrike" kern="1200" cap="none" spc="0" normalizeH="0" baseline="0" noProof="0" dirty="0">
+                          <a:ln>
+                            <a:noFill/>
+                          </a:ln>
+                          <a:solidFill>
+                            <a:prstClr val="black"/>
+                          </a:solidFill>
+                          <a:effectLst/>
+                          <a:uLnTx/>
+                          <a:uFillTx/>
+                          <a:latin typeface="+mn-lt"/>
+                          <a:ea typeface="+mn-ea"/>
+                          <a:cs typeface="+mn-cs"/>
+                        </a:rPr>
+                        <a:t> – Seagulls</a:t>
+                      </a:r>
+                      <a:endParaRPr kumimoji="0" lang="en-US" sz="1000" b="0" i="0" u="none" strike="noStrike" kern="1200" cap="none" spc="0" normalizeH="0" baseline="0" noProof="0" dirty="0">
                         <a:ln>
                           <a:noFill/>
                         </a:ln>
@@ -8772,7 +9449,7 @@
                         <a:tabLst/>
                         <a:defRPr/>
                       </a:pPr>
-                      <a:endParaRPr kumimoji="0" lang="en-US" sz="1200" b="0" i="0" u="none" strike="noStrike" kern="1200" cap="none" spc="0" normalizeH="0" baseline="0" noProof="0" dirty="0">
+                      <a:endParaRPr kumimoji="0" lang="en-US" sz="600" b="0" i="0" u="none" strike="noStrike" kern="1200" cap="none" spc="0" normalizeH="0" baseline="0" noProof="0" dirty="0">
                         <a:ln>
                           <a:noFill/>
                         </a:ln>
@@ -8796,11 +9473,21 @@
                 </a:tc>
                 <a:extLst>
                   <a:ext uri="{0D108BD9-81ED-4DB2-BD59-A6C34878D82A}">
-                    <a16:rowId xmlns:a16="http://schemas.microsoft.com/office/drawing/2014/main" val="3054149442"/>
+                    <a16:rowId xmlns:a16="http://schemas.microsoft.com/office/drawing/2014/main" val="1779427962"/>
                   </a:ext>
                 </a:extLst>
               </a:tr>
-              <a:tr h="261705">
+              <a:tr h="198120">
+                <a:tc vMerge="1">
+                  <a:txBody>
+                    <a:bodyPr/>
+                    <a:lstStyle/>
+                    <a:p>
+                      <a:endParaRPr lang="en-GB"/>
+                    </a:p>
+                  </a:txBody>
+                  <a:tcPr/>
+                </a:tc>
                 <a:tc>
                   <a:txBody>
                     <a:bodyPr/>
@@ -8823,8 +9510,59 @@
                         <a:tabLst/>
                         <a:defRPr/>
                       </a:pPr>
+                      <a:endParaRPr kumimoji="0" lang="en-US" sz="600" b="0" i="0" u="none" strike="noStrike" kern="1200" cap="none" spc="0" normalizeH="0" baseline="0" noProof="0" dirty="0">
+                        <a:ln>
+                          <a:noFill/>
+                        </a:ln>
+                        <a:solidFill>
+                          <a:prstClr val="black"/>
+                        </a:solidFill>
+                        <a:effectLst/>
+                        <a:uLnTx/>
+                        <a:uFillTx/>
+                        <a:latin typeface="+mn-lt"/>
+                        <a:ea typeface="+mn-ea"/>
+                        <a:cs typeface="Arial"/>
+                      </a:endParaRPr>
+                    </a:p>
+                  </a:txBody>
+                  <a:tcPr>
+                    <a:solidFill>
+                      <a:srgbClr val="FFC000"/>
+                    </a:solidFill>
+                  </a:tcPr>
+                </a:tc>
+                <a:extLst>
+                  <a:ext uri="{0D108BD9-81ED-4DB2-BD59-A6C34878D82A}">
+                    <a16:rowId xmlns:a16="http://schemas.microsoft.com/office/drawing/2014/main" val="928936673"/>
+                  </a:ext>
+                </a:extLst>
+              </a:tr>
+              <a:tr h="182880">
+                <a:tc rowSpan="3">
+                  <a:txBody>
+                    <a:bodyPr/>
+                    <a:lstStyle/>
+                    <a:p>
+                      <a:pPr marL="0" marR="0" lvl="0" indent="0" algn="l" defTabSz="914400" rtl="0" eaLnBrk="1" fontAlgn="base" latinLnBrk="0" hangingPunct="1">
+                        <a:lnSpc>
+                          <a:spcPct val="100000"/>
+                        </a:lnSpc>
+                        <a:spcBef>
+                          <a:spcPct val="0"/>
+                        </a:spcBef>
+                        <a:spcAft>
+                          <a:spcPct val="0"/>
+                        </a:spcAft>
+                        <a:buClrTx/>
+                        <a:buSzTx/>
+                        <a:buFontTx/>
+                        <a:buNone/>
+                        <a:tabLst/>
+                        <a:defRPr/>
+                      </a:pPr>
                       <a:r>
-                        <a:rPr kumimoji="0" lang="en-US" sz="1200" b="0" i="0" u="none" strike="noStrike" kern="1200" cap="none" spc="0" normalizeH="0" baseline="0" noProof="0" dirty="0">
+                        <a:rPr kumimoji="0" lang="en-US" sz="1000" b="0" i="0" u="none" strike="noStrike" kern="1200" cap="none" spc="0" normalizeH="0" baseline="0" noProof="0" dirty="0">
                           <a:ln>
                             <a:noFill/>
                           </a:ln>
@@ -8838,9 +9576,92 @@
                           <a:ea typeface="+mn-ea"/>
                           <a:cs typeface="+mn-cs"/>
                         </a:rPr>
-                        <a:t>Telemetry</a:t>
+                        <a:t>Telemetry – UI Design</a:t>
                       </a:r>
-                      <a:endParaRPr kumimoji="0" lang="en-US" sz="1200" b="0" i="0" u="none" strike="noStrike" kern="1200" cap="none" spc="0" normalizeH="0" baseline="0" noProof="0" dirty="0">
+                      <a:br>
+                        <a:rPr kumimoji="0" lang="en-US" sz="1000" b="0" i="0" u="none" strike="noStrike" kern="1200" cap="none" spc="0" normalizeH="0" baseline="0" noProof="0" dirty="0">
+                          <a:ln>
+                            <a:noFill/>
+                          </a:ln>
+                          <a:solidFill>
+                            <a:prstClr val="black"/>
+                          </a:solidFill>
+                          <a:effectLst/>
+                          <a:uLnTx/>
+                          <a:uFillTx/>
+                          <a:latin typeface="+mn-lt"/>
+                          <a:ea typeface="+mn-ea"/>
+                          <a:cs typeface="+mn-cs"/>
+                        </a:rPr>
+                      </a:br>
+                      <a:r>
+                        <a:rPr kumimoji="0" lang="en-US" sz="1000" b="0" i="0" u="none" strike="noStrike" kern="1200" cap="none" spc="0" normalizeH="0" baseline="0" noProof="0" dirty="0">
+                          <a:ln>
+                            <a:noFill/>
+                          </a:ln>
+                          <a:solidFill>
+                            <a:prstClr val="black"/>
+                          </a:solidFill>
+                          <a:effectLst/>
+                          <a:uLnTx/>
+                          <a:uFillTx/>
+                          <a:latin typeface="+mn-lt"/>
+                          <a:ea typeface="+mn-ea"/>
+                          <a:cs typeface="+mn-cs"/>
+                        </a:rPr>
+                        <a:t>Telemetry – Data acquisition</a:t>
+                      </a:r>
+                      <a:endParaRPr kumimoji="0" lang="en-US" sz="1000" b="0" i="0" u="none" strike="noStrike" kern="1200" cap="none" spc="0" normalizeH="0" baseline="0" noProof="0" dirty="0">
+                        <a:ln>
+                          <a:noFill/>
+                        </a:ln>
+                        <a:solidFill>
+                          <a:prstClr val="black"/>
+                        </a:solidFill>
+                        <a:effectLst/>
+                        <a:uLnTx/>
+                        <a:uFillTx/>
+                        <a:latin typeface="+mn-lt"/>
+                        <a:ea typeface="+mn-ea"/>
+                        <a:cs typeface="Arial"/>
+                      </a:endParaRPr>
+                    </a:p>
+                    <a:p>
+                      <a:pPr marL="0" marR="0" lvl="0" indent="0" algn="l" defTabSz="914400" rtl="0" eaLnBrk="1" fontAlgn="base" latinLnBrk="0" hangingPunct="1">
+                        <a:lnSpc>
+                          <a:spcPct val="100000"/>
+                        </a:lnSpc>
+                        <a:spcBef>
+                          <a:spcPct val="0"/>
+                        </a:spcBef>
+                        <a:spcAft>
+                          <a:spcPct val="0"/>
+                        </a:spcAft>
+                        <a:buClrTx/>
+                        <a:buSzTx/>
+                        <a:buFontTx/>
+                        <a:buNone/>
+                        <a:tabLst/>
+                        <a:defRPr/>
+                      </a:pPr>
+                      <a:r>
+                        <a:rPr kumimoji="0" lang="en-US" sz="1000" b="0" i="0" u="none" strike="noStrike" kern="1200" cap="none" spc="0" normalizeH="0" baseline="0" noProof="0" dirty="0">
+                          <a:ln>
+                            <a:noFill/>
+                          </a:ln>
+                          <a:solidFill>
+                            <a:prstClr val="black"/>
+                          </a:solidFill>
+                          <a:effectLst/>
+                          <a:uLnTx/>
+                          <a:uFillTx/>
+                          <a:latin typeface="+mn-lt"/>
+                          <a:ea typeface="+mn-ea"/>
+                          <a:cs typeface="+mn-cs"/>
+                        </a:rPr>
+                        <a:t>Telemetry – Camera feed</a:t>
+                      </a:r>
+                      <a:endParaRPr kumimoji="0" lang="en-US" sz="1000" b="0" i="0" u="none" strike="noStrike" kern="1200" cap="none" spc="0" normalizeH="0" baseline="0" noProof="0" dirty="0">
                         <a:ln>
                           <a:noFill/>
                         </a:ln>
@@ -8880,7 +9701,7 @@
                         <a:tabLst/>
                         <a:defRPr/>
                       </a:pPr>
-                      <a:endParaRPr kumimoji="0" lang="en-US" sz="1200" b="0" i="0" u="none" strike="noStrike" kern="1200" cap="none" spc="0" normalizeH="0" baseline="0" noProof="0" dirty="0">
+                      <a:endParaRPr kumimoji="0" lang="en-US" sz="600" b="0" i="0" u="none" strike="noStrike" kern="1200" cap="none" spc="0" normalizeH="0" baseline="0" noProof="0" dirty="0">
                         <a:ln>
                           <a:noFill/>
                         </a:ln>
@@ -8898,13 +9719,135 @@
                   </a:txBody>
                   <a:tcPr>
                     <a:solidFill>
-                      <a:srgbClr val="FFC000"/>
+                      <a:srgbClr val="92D050"/>
                     </a:solidFill>
                   </a:tcPr>
                 </a:tc>
                 <a:extLst>
                   <a:ext uri="{0D108BD9-81ED-4DB2-BD59-A6C34878D82A}">
-                    <a16:rowId xmlns:a16="http://schemas.microsoft.com/office/drawing/2014/main" val="288140152"/>
+                    <a16:rowId xmlns:a16="http://schemas.microsoft.com/office/drawing/2014/main" val="3837113402"/>
+                  </a:ext>
+                </a:extLst>
+              </a:tr>
+              <a:tr h="182880">
+                <a:tc vMerge="1">
+                  <a:txBody>
+                    <a:bodyPr/>
+                    <a:lstStyle/>
+                    <a:p>
+                      <a:endParaRPr lang="en-GB"/>
+                    </a:p>
+                  </a:txBody>
+                  <a:tcPr/>
+                </a:tc>
+                <a:tc>
+                  <a:txBody>
+                    <a:bodyPr/>
+                    <a:lstStyle/>
+                    <a:p>
+                      <a:pPr marL="0" marR="0" lvl="0" indent="0" algn="l" defTabSz="914400" rtl="0" eaLnBrk="1" fontAlgn="base" latinLnBrk="0" hangingPunct="1">
+                        <a:lnSpc>
+                          <a:spcPct val="100000"/>
+                        </a:lnSpc>
+                        <a:spcBef>
+                          <a:spcPct val="0"/>
+                        </a:spcBef>
+                        <a:spcAft>
+                          <a:spcPct val="0"/>
+                        </a:spcAft>
+                        <a:buClrTx/>
+                        <a:buSzTx/>
+                        <a:buFontTx/>
+                        <a:buNone/>
+                        <a:tabLst/>
+                        <a:defRPr/>
+                      </a:pPr>
+                      <a:endParaRPr kumimoji="0" lang="en-US" sz="600" b="0" i="0" u="none" strike="noStrike" kern="1200" cap="none" spc="0" normalizeH="0" baseline="0" noProof="0" dirty="0">
+                        <a:ln>
+                          <a:noFill/>
+                        </a:ln>
+                        <a:solidFill>
+                          <a:prstClr val="black"/>
+                        </a:solidFill>
+                        <a:effectLst/>
+                        <a:uLnTx/>
+                        <a:uFillTx/>
+                        <a:latin typeface="+mn-lt"/>
+                        <a:ea typeface="+mn-ea"/>
+                        <a:cs typeface="Arial"/>
+                      </a:endParaRPr>
+                    </a:p>
+                  </a:txBody>
+                  <a:tcPr>
+                    <a:solidFill>
+                      <a:srgbClr val="FF0000"/>
+                    </a:solidFill>
+                  </a:tcPr>
+                </a:tc>
+                <a:extLst>
+                  <a:ext uri="{0D108BD9-81ED-4DB2-BD59-A6C34878D82A}">
+                    <a16:rowId xmlns:a16="http://schemas.microsoft.com/office/drawing/2014/main" val="2905718134"/>
+                  </a:ext>
+                </a:extLst>
+              </a:tr>
+              <a:tr h="182880">
+                <a:tc vMerge="1">
+                  <a:txBody>
+                    <a:bodyPr/>
+                    <a:lstStyle/>
+                    <a:p>
+                      <a:endParaRPr lang="en-GB"/>
+                    </a:p>
+                  </a:txBody>
+                  <a:tcPr/>
+                </a:tc>
+                <a:tc>
+                  <a:txBody>
+                    <a:bodyPr/>
+                    <a:lstStyle/>
+                    <a:p>
+                      <a:pPr marL="0" marR="0" lvl="0" indent="0" algn="l" defTabSz="914400" rtl="0" eaLnBrk="1" fontAlgn="base" latinLnBrk="0" hangingPunct="1">
+                        <a:lnSpc>
+                          <a:spcPct val="100000"/>
+                        </a:lnSpc>
+                        <a:spcBef>
+                          <a:spcPct val="0"/>
+                        </a:spcBef>
+                        <a:spcAft>
+                          <a:spcPct val="0"/>
+                        </a:spcAft>
+                        <a:buClrTx/>
+                        <a:buSzTx/>
+                        <a:buFontTx/>
+                        <a:buNone/>
+                        <a:tabLst/>
+                        <a:defRPr/>
+                      </a:pPr>
+                      <a:endParaRPr kumimoji="0" lang="en-US" sz="600" b="0" i="0" u="none" strike="noStrike" kern="1200" cap="none" spc="0" normalizeH="0" baseline="0" noProof="0" dirty="0">
+                        <a:ln>
+                          <a:noFill/>
+                        </a:ln>
+                        <a:solidFill>
+                          <a:prstClr val="black"/>
+                        </a:solidFill>
+                        <a:effectLst/>
+                        <a:uLnTx/>
+                        <a:uFillTx/>
+                        <a:latin typeface="+mn-lt"/>
+                        <a:ea typeface="+mn-ea"/>
+                        <a:cs typeface="Arial"/>
+                      </a:endParaRPr>
+                    </a:p>
+                  </a:txBody>
+                  <a:tcPr>
+                    <a:solidFill>
+                      <a:srgbClr val="92D050"/>
+                    </a:solidFill>
+                  </a:tcPr>
+                </a:tc>
+                <a:extLst>
+                  <a:ext uri="{0D108BD9-81ED-4DB2-BD59-A6C34878D82A}">
+                    <a16:rowId xmlns:a16="http://schemas.microsoft.com/office/drawing/2014/main" val="3332964534"/>
                   </a:ext>
                 </a:extLst>
               </a:tr>
@@ -8912,6 +9855,138 @@
           </a:graphicData>
         </a:graphic>
       </p:graphicFrame>
+      <p:pic>
+        <p:nvPicPr>
+          <p:cNvPr id="1026" name="Picture 2">
+            <a:extLst>
+              <a:ext uri="{FF2B5EF4-FFF2-40B4-BE49-F238E27FC236}">
+                <a16:creationId xmlns:a16="http://schemas.microsoft.com/office/drawing/2014/main" id="{53AAA507-7C6A-4CA3-A4B8-255545EDC479}"/>
+              </a:ext>
+            </a:extLst>
+          </p:cNvPr>
+          <p:cNvPicPr>
+            <a:picLocks noChangeAspect="1" noChangeArrowheads="1"/>
+          </p:cNvPicPr>
+          <p:nvPr/>
+        </p:nvPicPr>
+        <p:blipFill>
+          <a:blip r:embed="rId10">
+            <a:extLst>
+              <a:ext uri="{28A0092B-C50C-407E-A947-70E740481C1C}">
+                <a14:useLocalDpi xmlns:a14="http://schemas.microsoft.com/office/drawing/2010/main" val="0"/>
+              </a:ext>
+            </a:extLst>
+          </a:blip>
+          <a:srcRect/>
+          <a:stretch>
+            <a:fillRect/>
+          </a:stretch>
+        </p:blipFill>
+        <p:spPr bwMode="auto">
+          <a:xfrm>
+            <a:off x="11779127" y="6997396"/>
+            <a:ext cx="728293" cy="604554"/>
+          </a:xfrm>
+          <a:prstGeom prst="rect">
+            <a:avLst/>
+          </a:prstGeom>
+          <a:noFill/>
+          <a:extLst>
+            <a:ext uri="{909E8E84-426E-40DD-AFC4-6F175D3DCCD1}">
+              <a14:hiddenFill xmlns:a14="http://schemas.microsoft.com/office/drawing/2010/main">
+                <a:solidFill>
+                  <a:srgbClr val="FFFFFF"/>
+                </a:solidFill>
+              </a14:hiddenFill>
+            </a:ext>
+          </a:extLst>
+        </p:spPr>
+      </p:pic>
+      <p:pic>
+        <p:nvPicPr>
+          <p:cNvPr id="32" name="Picture 31" descr="A close up of a map&#10;&#10;Description automatically generated">
+            <a:extLst>
+              <a:ext uri="{FF2B5EF4-FFF2-40B4-BE49-F238E27FC236}">
+                <a16:creationId xmlns:a16="http://schemas.microsoft.com/office/drawing/2014/main" id="{2AD40C2C-C8E7-4D63-AFCE-0E64003737E6}"/>
+              </a:ext>
+            </a:extLst>
+          </p:cNvPr>
+          <p:cNvPicPr>
+            <a:picLocks noChangeAspect="1"/>
+          </p:cNvPicPr>
+          <p:nvPr/>
+        </p:nvPicPr>
+        <p:blipFill>
+          <a:blip r:embed="rId11">
+            <a:extLst>
+              <a:ext uri="{28A0092B-C50C-407E-A947-70E740481C1C}">
+                <a14:useLocalDpi xmlns:a14="http://schemas.microsoft.com/office/drawing/2010/main" val="0"/>
+              </a:ext>
+            </a:extLst>
+          </a:blip>
+          <a:stretch>
+            <a:fillRect/>
+          </a:stretch>
+        </p:blipFill>
+        <p:spPr>
+          <a:xfrm>
+            <a:off x="4644047" y="4939598"/>
+            <a:ext cx="3556953" cy="2468208"/>
+          </a:xfrm>
+          <a:prstGeom prst="rect">
+            <a:avLst/>
+          </a:prstGeom>
+        </p:spPr>
+      </p:pic>
+      <p:sp>
+        <p:nvSpPr>
+          <p:cNvPr id="46" name="TextBox 45">
+            <a:extLst>
+              <a:ext uri="{FF2B5EF4-FFF2-40B4-BE49-F238E27FC236}">
+                <a16:creationId xmlns:a16="http://schemas.microsoft.com/office/drawing/2014/main" id="{9FD0354B-EC9F-4222-83C8-777574DD7AD8}"/>
+              </a:ext>
+            </a:extLst>
+          </p:cNvPr>
+          <p:cNvSpPr txBox="1"/>
+          <p:nvPr/>
+        </p:nvSpPr>
+        <p:spPr>
+          <a:xfrm>
+            <a:off x="3074030" y="8382823"/>
+            <a:ext cx="2564833" cy="1224752"/>
+          </a:xfrm>
+          <a:prstGeom prst="rect">
+            <a:avLst/>
+          </a:prstGeom>
+        </p:spPr>
+        <p:style>
+          <a:lnRef idx="2">
+            <a:schemeClr val="dk1"/>
+          </a:lnRef>
+          <a:fillRef idx="1">
+            <a:schemeClr val="lt1"/>
+          </a:fillRef>
+          <a:effectRef idx="0">
+            <a:schemeClr val="dk1"/>
+          </a:effectRef>
+          <a:fontRef idx="minor">
+            <a:schemeClr val="dk1"/>
+          </a:fontRef>
+        </p:style>
+        <p:txBody>
+          <a:bodyPr vert="horz" wrap="square" lIns="128016" tIns="64008" rIns="128016" bIns="64008" rtlCol="0" anchor="t">
+            <a:normAutofit/>
+          </a:bodyPr>
+          <a:lstStyle/>
+          <a:p>
+            <a:r>
+              <a:rPr lang="en-US" b="1" dirty="0"/>
+              <a:t>Key</a:t>
+            </a:r>
+            <a:endParaRPr lang="en-US" sz="1200" dirty="0"/>
+          </a:p>
+        </p:txBody>
+      </p:sp>
       <p:graphicFrame>
         <p:nvGraphicFramePr>
           <p:cNvPr id="18" name="Table 17">
@@ -8927,13 +10002,13 @@
           <p:nvPr>
             <p:extLst>
               <p:ext uri="{D42A27DB-BD31-4B8C-83A1-F6EECF244321}">
-                <p14:modId xmlns:p14="http://schemas.microsoft.com/office/powerpoint/2010/main" val="786150895"/>
+                <p14:modId xmlns:p14="http://schemas.microsoft.com/office/powerpoint/2010/main" val="1979686446"/>
               </p:ext>
             </p:extLst>
           </p:nvPr>
         </p:nvGraphicFramePr>
         <p:xfrm>
-          <a:off x="5305882" y="8396998"/>
+          <a:off x="3705246" y="8373128"/>
           <a:ext cx="1877601" cy="1219200"/>
         </p:xfrm>
         <a:graphic>
@@ -8958,7 +10033,7 @@
                   </a:extLst>
                 </a:gridCol>
               </a:tblGrid>
-              <a:tr h="225976">
+              <a:tr h="300006">
                 <a:tc>
                   <a:txBody>
                     <a:bodyPr/>
@@ -8988,7 +10063,7 @@
                   </a:ext>
                 </a:extLst>
               </a:tr>
-              <a:tr h="225976">
+              <a:tr h="300006">
                 <a:tc>
                   <a:txBody>
                     <a:bodyPr/>
@@ -9052,7 +10127,7 @@
                   </a:ext>
                 </a:extLst>
               </a:tr>
-              <a:tr h="225976">
+              <a:tr h="300006">
                 <a:tc>
                   <a:txBody>
                     <a:bodyPr/>
@@ -9116,7 +10191,7 @@
                   </a:ext>
                 </a:extLst>
               </a:tr>
-              <a:tr h="225976">
+              <a:tr h="300006">
                 <a:tc>
                   <a:txBody>
                     <a:bodyPr/>
@@ -9184,195 +10259,6 @@
           </a:graphicData>
         </a:graphic>
       </p:graphicFrame>
-      <p:pic>
-        <p:nvPicPr>
-          <p:cNvPr id="1026" name="Picture 2">
-            <a:extLst>
-              <a:ext uri="{FF2B5EF4-FFF2-40B4-BE49-F238E27FC236}">
-                <a16:creationId xmlns:a16="http://schemas.microsoft.com/office/drawing/2014/main" id="{53AAA507-7C6A-4CA3-A4B8-255545EDC479}"/>
-              </a:ext>
-            </a:extLst>
-          </p:cNvPr>
-          <p:cNvPicPr>
-            <a:picLocks noChangeAspect="1" noChangeArrowheads="1"/>
-          </p:cNvPicPr>
-          <p:nvPr/>
-        </p:nvPicPr>
-        <p:blipFill>
-          <a:blip r:embed="rId10">
-            <a:extLst>
-              <a:ext uri="{28A0092B-C50C-407E-A947-70E740481C1C}">
-                <a14:useLocalDpi xmlns:a14="http://schemas.microsoft.com/office/drawing/2010/main" val="0"/>
-              </a:ext>
-            </a:extLst>
-          </a:blip>
-          <a:srcRect/>
-          <a:stretch>
-            <a:fillRect/>
-          </a:stretch>
-        </p:blipFill>
-        <p:spPr bwMode="auto">
-          <a:xfrm>
-            <a:off x="11779127" y="6997396"/>
-            <a:ext cx="728293" cy="604554"/>
-          </a:xfrm>
-          <a:prstGeom prst="rect">
-            <a:avLst/>
-          </a:prstGeom>
-          <a:noFill/>
-          <a:extLst>
-            <a:ext uri="{909E8E84-426E-40DD-AFC4-6F175D3DCCD1}">
-              <a14:hiddenFill xmlns:a14="http://schemas.microsoft.com/office/drawing/2010/main">
-                <a:solidFill>
-                  <a:srgbClr val="FFFFFF"/>
-                </a:solidFill>
-              </a14:hiddenFill>
-            </a:ext>
-          </a:extLst>
-        </p:spPr>
-      </p:pic>
-      <p:pic>
-        <p:nvPicPr>
-          <p:cNvPr id="30" name="Picture 29">
-            <a:extLst>
-              <a:ext uri="{FF2B5EF4-FFF2-40B4-BE49-F238E27FC236}">
-                <a16:creationId xmlns:a16="http://schemas.microsoft.com/office/drawing/2014/main" id="{20784C4D-168B-4FED-B4FE-ED29EBD0808D}"/>
-              </a:ext>
-            </a:extLst>
-          </p:cNvPr>
-          <p:cNvPicPr>
-            <a:picLocks noChangeAspect="1"/>
-          </p:cNvPicPr>
-          <p:nvPr/>
-        </p:nvPicPr>
-        <p:blipFill rotWithShape="1">
-          <a:blip r:embed="rId11"/>
-          <a:srcRect l="7233" t="3970" r="8306" b="5466"/>
-          <a:stretch/>
-        </p:blipFill>
-        <p:spPr>
-          <a:xfrm>
-            <a:off x="4367722" y="4048559"/>
-            <a:ext cx="4035416" cy="3466124"/>
-          </a:xfrm>
-          <a:prstGeom prst="rect">
-            <a:avLst/>
-          </a:prstGeom>
-        </p:spPr>
-      </p:pic>
-      <p:sp>
-        <p:nvSpPr>
-          <p:cNvPr id="31" name="TextBox 30">
-            <a:extLst>
-              <a:ext uri="{FF2B5EF4-FFF2-40B4-BE49-F238E27FC236}">
-                <a16:creationId xmlns:a16="http://schemas.microsoft.com/office/drawing/2014/main" id="{B59537D8-D689-4699-9A6B-8B6644A19E21}"/>
-              </a:ext>
-            </a:extLst>
-          </p:cNvPr>
-          <p:cNvSpPr txBox="1"/>
-          <p:nvPr/>
-        </p:nvSpPr>
-        <p:spPr>
-          <a:xfrm>
-            <a:off x="4848374" y="5249025"/>
-            <a:ext cx="851409" cy="388312"/>
-          </a:xfrm>
-          <a:prstGeom prst="rect">
-            <a:avLst/>
-          </a:prstGeom>
-          <a:solidFill>
-            <a:srgbClr val="92D050"/>
-          </a:solidFill>
-        </p:spPr>
-        <p:txBody>
-          <a:bodyPr vert="horz" wrap="square" lIns="91440" tIns="45720" rIns="91440" bIns="45720" rtlCol="0" anchor="ctr">
-            <a:noAutofit/>
-          </a:bodyPr>
-          <a:lstStyle/>
-          <a:p>
-            <a:r>
-              <a:rPr lang="en-GB" sz="1200" b="0" dirty="0"/>
-              <a:t>Pathing +Alerts</a:t>
-            </a:r>
-          </a:p>
-        </p:txBody>
-      </p:sp>
-      <p:sp>
-        <p:nvSpPr>
-          <p:cNvPr id="53" name="TextBox 52">
-            <a:extLst>
-              <a:ext uri="{FF2B5EF4-FFF2-40B4-BE49-F238E27FC236}">
-                <a16:creationId xmlns:a16="http://schemas.microsoft.com/office/drawing/2014/main" id="{78864AD3-D425-494B-A00A-54E7E4B663B9}"/>
-              </a:ext>
-            </a:extLst>
-          </p:cNvPr>
-          <p:cNvSpPr txBox="1"/>
-          <p:nvPr/>
-        </p:nvSpPr>
-        <p:spPr>
-          <a:xfrm>
-            <a:off x="7134290" y="5249025"/>
-            <a:ext cx="902008" cy="425364"/>
-          </a:xfrm>
-          <a:prstGeom prst="rect">
-            <a:avLst/>
-          </a:prstGeom>
-          <a:solidFill>
-            <a:srgbClr val="92D050"/>
-          </a:solidFill>
-        </p:spPr>
-        <p:txBody>
-          <a:bodyPr vert="horz" wrap="square" lIns="91440" tIns="45720" rIns="91440" bIns="45720" rtlCol="0" anchor="ctr">
-            <a:noAutofit/>
-          </a:bodyPr>
-          <a:lstStyle/>
-          <a:p>
-            <a:r>
-              <a:rPr lang="en-GB" sz="1200" b="0" dirty="0"/>
-              <a:t>Pathing +Alerts</a:t>
-            </a:r>
-          </a:p>
-        </p:txBody>
-      </p:sp>
-      <p:sp>
-        <p:nvSpPr>
-          <p:cNvPr id="54" name="TextBox 53">
-            <a:extLst>
-              <a:ext uri="{FF2B5EF4-FFF2-40B4-BE49-F238E27FC236}">
-                <a16:creationId xmlns:a16="http://schemas.microsoft.com/office/drawing/2014/main" id="{0ED00204-46CF-4A18-80DC-9A3AFB1B7DF4}"/>
-              </a:ext>
-            </a:extLst>
-          </p:cNvPr>
-          <p:cNvSpPr txBox="1"/>
-          <p:nvPr/>
-        </p:nvSpPr>
-        <p:spPr>
-          <a:xfrm>
-            <a:off x="5785046" y="5726237"/>
-            <a:ext cx="1191818" cy="388312"/>
-          </a:xfrm>
-          <a:prstGeom prst="rect">
-            <a:avLst/>
-          </a:prstGeom>
-          <a:solidFill>
-            <a:srgbClr val="92D050"/>
-          </a:solidFill>
-        </p:spPr>
-        <p:txBody>
-          <a:bodyPr vert="horz" wrap="square" lIns="91440" tIns="45720" rIns="91440" bIns="45720" rtlCol="0" anchor="ctr">
-            <a:normAutofit/>
-          </a:bodyPr>
-          <a:lstStyle/>
-          <a:p>
-            <a:pPr algn="ctr"/>
-            <a:r>
-              <a:rPr lang="en-GB" sz="1200" dirty="0"/>
-              <a:t>Feedback</a:t>
-            </a:r>
-            <a:endParaRPr lang="en-GB" sz="1200" b="0" dirty="0"/>
-          </a:p>
-        </p:txBody>
-      </p:sp>
     </p:spTree>
   </p:cSld>
   <p:clrMapOvr>

</xml_diff>